<commit_message>
ajout résumé design pattern
</commit_message>
<xml_diff>
--- a/0_ressources/design_patterns.pptx
+++ b/0_ressources/design_patterns.pptx
@@ -5,7 +5,7 @@
     <p:sldMasterId id="2147483648" r:id="rId1"/>
   </p:sldMasterIdLst>
   <p:notesMasterIdLst>
-    <p:notesMasterId r:id="rId7"/>
+    <p:notesMasterId r:id="rId8"/>
   </p:notesMasterIdLst>
   <p:sldIdLst>
     <p:sldId id="256" r:id="rId2"/>
@@ -13,6 +13,7 @@
     <p:sldId id="268" r:id="rId4"/>
     <p:sldId id="269" r:id="rId5"/>
     <p:sldId id="270" r:id="rId6"/>
+    <p:sldId id="271" r:id="rId7"/>
   </p:sldIdLst>
   <p:sldSz cx="12192000" cy="6858000"/>
   <p:notesSz cx="6858000" cy="9144000"/>
@@ -201,7 +202,7 @@
           <a:p>
             <a:fld id="{2A11EF29-F031-4460-BDC1-2F4C0816FF62}" type="datetimeFigureOut">
               <a:rPr lang="fr-FR" smtClean="0"/>
-              <a:t>03/01/2020</a:t>
+              <a:t>19/01/2020</a:t>
             </a:fld>
             <a:endParaRPr lang="fr-FR"/>
           </a:p>
@@ -804,6 +805,90 @@
 </p:notes>
 </file>
 
+<file path=ppt/notesSlides/notesSlide5.xml><?xml version="1.0" encoding="utf-8"?>
+<p:notes xmlns:a="http://schemas.openxmlformats.org/drawingml/2006/main" xmlns:r="http://schemas.openxmlformats.org/officeDocument/2006/relationships" xmlns:p="http://schemas.openxmlformats.org/presentationml/2006/main">
+  <p:cSld>
+    <p:spTree>
+      <p:nvGrpSpPr>
+        <p:cNvPr id="1" name=""/>
+        <p:cNvGrpSpPr/>
+        <p:nvPr/>
+      </p:nvGrpSpPr>
+      <p:grpSpPr>
+        <a:xfrm>
+          <a:off x="0" y="0"/>
+          <a:ext cx="0" cy="0"/>
+          <a:chOff x="0" y="0"/>
+          <a:chExt cx="0" cy="0"/>
+        </a:xfrm>
+      </p:grpSpPr>
+      <p:sp>
+        <p:nvSpPr>
+          <p:cNvPr id="2" name="Espace réservé de l'image des diapositives 1"/>
+          <p:cNvSpPr>
+            <a:spLocks noGrp="1" noRot="1" noChangeAspect="1"/>
+          </p:cNvSpPr>
+          <p:nvPr>
+            <p:ph type="sldImg"/>
+          </p:nvPr>
+        </p:nvSpPr>
+        <p:spPr/>
+      </p:sp>
+      <p:sp>
+        <p:nvSpPr>
+          <p:cNvPr id="3" name="Espace réservé des commentaires 2"/>
+          <p:cNvSpPr>
+            <a:spLocks noGrp="1"/>
+          </p:cNvSpPr>
+          <p:nvPr>
+            <p:ph type="body" idx="1"/>
+          </p:nvPr>
+        </p:nvSpPr>
+        <p:spPr/>
+        <p:txBody>
+          <a:bodyPr/>
+          <a:lstStyle/>
+          <a:p>
+            <a:endParaRPr lang="fr-FR" dirty="0"/>
+          </a:p>
+        </p:txBody>
+      </p:sp>
+      <p:sp>
+        <p:nvSpPr>
+          <p:cNvPr id="4" name="Espace réservé du numéro de diapositive 3"/>
+          <p:cNvSpPr>
+            <a:spLocks noGrp="1"/>
+          </p:cNvSpPr>
+          <p:nvPr>
+            <p:ph type="sldNum" sz="quarter" idx="10"/>
+          </p:nvPr>
+        </p:nvSpPr>
+        <p:spPr/>
+        <p:txBody>
+          <a:bodyPr/>
+          <a:lstStyle/>
+          <a:p>
+            <a:fld id="{EF12E977-82C1-4366-8217-70F96AE9AED3}" type="slidenum">
+              <a:rPr lang="fr-FR" smtClean="0"/>
+              <a:t>6</a:t>
+            </a:fld>
+            <a:endParaRPr lang="fr-FR"/>
+          </a:p>
+        </p:txBody>
+      </p:sp>
+    </p:spTree>
+    <p:extLst>
+      <p:ext uri="{BB962C8B-B14F-4D97-AF65-F5344CB8AC3E}">
+        <p14:creationId xmlns:p14="http://schemas.microsoft.com/office/powerpoint/2010/main" val="2326320791"/>
+      </p:ext>
+    </p:extLst>
+  </p:cSld>
+  <p:clrMapOvr>
+    <a:masterClrMapping/>
+  </p:clrMapOvr>
+</p:notes>
+</file>
+
 <file path=ppt/slideLayouts/slideLayout1.xml><?xml version="1.0" encoding="utf-8"?>
 <p:sldLayout xmlns:a="http://schemas.openxmlformats.org/drawingml/2006/main" xmlns:r="http://schemas.openxmlformats.org/officeDocument/2006/relationships" xmlns:p="http://schemas.openxmlformats.org/presentationml/2006/main" type="title" preserve="1">
   <p:cSld name="Diapositive de titre">
@@ -933,7 +1018,7 @@
           <a:p>
             <a:fld id="{61E68B4C-A18C-4580-9DBF-10C1B552DA0A}" type="datetime1">
               <a:rPr lang="fr-FR" smtClean="0"/>
-              <a:t>03/01/2020</a:t>
+              <a:t>19/01/2020</a:t>
             </a:fld>
             <a:endParaRPr lang="fr-FR"/>
           </a:p>
@@ -1104,7 +1189,7 @@
           <a:p>
             <a:fld id="{33BBDF30-760E-44D6-9977-54B88BDB306F}" type="datetime1">
               <a:rPr lang="fr-FR" smtClean="0"/>
-              <a:t>03/01/2020</a:t>
+              <a:t>19/01/2020</a:t>
             </a:fld>
             <a:endParaRPr lang="fr-FR"/>
           </a:p>
@@ -1285,7 +1370,7 @@
           <a:p>
             <a:fld id="{936C1701-50D5-46A3-8884-D7962FCBEB35}" type="datetime1">
               <a:rPr lang="fr-FR" smtClean="0"/>
-              <a:t>03/01/2020</a:t>
+              <a:t>19/01/2020</a:t>
             </a:fld>
             <a:endParaRPr lang="fr-FR"/>
           </a:p>
@@ -1456,7 +1541,7 @@
           <a:p>
             <a:fld id="{FB1C5CD7-A317-4B47-8334-BE6C77F3043D}" type="datetime1">
               <a:rPr lang="fr-FR" smtClean="0"/>
-              <a:t>03/01/2020</a:t>
+              <a:t>19/01/2020</a:t>
             </a:fld>
             <a:endParaRPr lang="fr-FR"/>
           </a:p>
@@ -1704,7 +1789,7 @@
           <a:p>
             <a:fld id="{27BB4E62-2182-4E64-A865-E0316FE55639}" type="datetime1">
               <a:rPr lang="fr-FR" smtClean="0"/>
-              <a:t>03/01/2020</a:t>
+              <a:t>19/01/2020</a:t>
             </a:fld>
             <a:endParaRPr lang="fr-FR"/>
           </a:p>
@@ -1936,7 +2021,7 @@
           <a:p>
             <a:fld id="{5C848654-37BD-4CD6-BC6D-5ABAE3294E16}" type="datetime1">
               <a:rPr lang="fr-FR" smtClean="0"/>
-              <a:t>03/01/2020</a:t>
+              <a:t>19/01/2020</a:t>
             </a:fld>
             <a:endParaRPr lang="fr-FR"/>
           </a:p>
@@ -2303,7 +2388,7 @@
           <a:p>
             <a:fld id="{868D0E6B-48A9-4A38-BF7D-049DC383303E}" type="datetime1">
               <a:rPr lang="fr-FR" smtClean="0"/>
-              <a:t>03/01/2020</a:t>
+              <a:t>19/01/2020</a:t>
             </a:fld>
             <a:endParaRPr lang="fr-FR"/>
           </a:p>
@@ -2423,7 +2508,7 @@
           <a:p>
             <a:fld id="{48C90E04-18E3-4E93-8B1D-B61C20F8CDF0}" type="datetime1">
               <a:rPr lang="fr-FR" smtClean="0"/>
-              <a:t>03/01/2020</a:t>
+              <a:t>19/01/2020</a:t>
             </a:fld>
             <a:endParaRPr lang="fr-FR"/>
           </a:p>
@@ -2521,7 +2606,7 @@
           <a:p>
             <a:fld id="{35B94D30-C13E-4A60-87D1-612090FE3305}" type="datetime1">
               <a:rPr lang="fr-FR" smtClean="0"/>
-              <a:t>03/01/2020</a:t>
+              <a:t>19/01/2020</a:t>
             </a:fld>
             <a:endParaRPr lang="fr-FR"/>
           </a:p>
@@ -2799,7 +2884,7 @@
           <a:p>
             <a:fld id="{566614E8-8C48-447B-8312-B5AD964AE5CA}" type="datetime1">
               <a:rPr lang="fr-FR" smtClean="0"/>
-              <a:t>03/01/2020</a:t>
+              <a:t>19/01/2020</a:t>
             </a:fld>
             <a:endParaRPr lang="fr-FR"/>
           </a:p>
@@ -3054,7 +3139,7 @@
           <a:p>
             <a:fld id="{269CDBDD-4A65-4264-B0FD-6A38E12ADD25}" type="datetime1">
               <a:rPr lang="fr-FR" smtClean="0"/>
-              <a:t>03/01/2020</a:t>
+              <a:t>19/01/2020</a:t>
             </a:fld>
             <a:endParaRPr lang="fr-FR"/>
           </a:p>
@@ -3268,7 +3353,7 @@
           <a:p>
             <a:fld id="{A2F7CCBE-29F8-4CD9-B9A9-0931E30CBD53}" type="datetime1">
               <a:rPr lang="fr-FR" smtClean="0"/>
-              <a:t>03/01/2020</a:t>
+              <a:t>19/01/2020</a:t>
             </a:fld>
             <a:endParaRPr lang="fr-FR"/>
           </a:p>
@@ -4369,6 +4454,166 @@
     <p:extLst>
       <p:ext uri="{BB962C8B-B14F-4D97-AF65-F5344CB8AC3E}">
         <p14:creationId xmlns:p14="http://schemas.microsoft.com/office/powerpoint/2010/main" val="2544442252"/>
+      </p:ext>
+    </p:extLst>
+  </p:cSld>
+  <p:clrMapOvr>
+    <a:masterClrMapping/>
+  </p:clrMapOvr>
+</p:sld>
+</file>
+
+<file path=ppt/slides/slide6.xml><?xml version="1.0" encoding="utf-8"?>
+<p:sld xmlns:a="http://schemas.openxmlformats.org/drawingml/2006/main" xmlns:r="http://schemas.openxmlformats.org/officeDocument/2006/relationships" xmlns:p="http://schemas.openxmlformats.org/presentationml/2006/main">
+  <p:cSld>
+    <p:spTree>
+      <p:nvGrpSpPr>
+        <p:cNvPr id="1" name=""/>
+        <p:cNvGrpSpPr/>
+        <p:nvPr/>
+      </p:nvGrpSpPr>
+      <p:grpSpPr>
+        <a:xfrm>
+          <a:off x="0" y="0"/>
+          <a:ext cx="0" cy="0"/>
+          <a:chOff x="0" y="0"/>
+          <a:chExt cx="0" cy="0"/>
+        </a:xfrm>
+      </p:grpSpPr>
+      <p:sp>
+        <p:nvSpPr>
+          <p:cNvPr id="2" name="Titre 1"/>
+          <p:cNvSpPr>
+            <a:spLocks noGrp="1"/>
+          </p:cNvSpPr>
+          <p:nvPr>
+            <p:ph type="title"/>
+          </p:nvPr>
+        </p:nvSpPr>
+        <p:spPr/>
+        <p:txBody>
+          <a:bodyPr/>
+          <a:lstStyle/>
+          <a:p>
+            <a:r>
+              <a:rPr lang="fr-FR" dirty="0"/>
+              <a:t>Design Pattern 5 : Observateur</a:t>
+            </a:r>
+          </a:p>
+        </p:txBody>
+      </p:sp>
+      <p:sp>
+        <p:nvSpPr>
+          <p:cNvPr id="3" name="Espace réservé du contenu 2"/>
+          <p:cNvSpPr>
+            <a:spLocks noGrp="1"/>
+          </p:cNvSpPr>
+          <p:nvPr>
+            <p:ph sz="half" idx="1"/>
+          </p:nvPr>
+        </p:nvSpPr>
+        <p:spPr/>
+        <p:txBody>
+          <a:bodyPr/>
+          <a:lstStyle/>
+          <a:p>
+            <a:r>
+              <a:rPr lang="fr-FR" dirty="0"/>
+              <a:t>Simplification de la gestion d’événements</a:t>
+            </a:r>
+          </a:p>
+          <a:p>
+            <a:r>
+              <a:rPr lang="fr-FR" dirty="0"/>
+              <a:t>Un élément observable notifie les éléments observateurs lors ce qu’une action se produit</a:t>
+            </a:r>
+          </a:p>
+        </p:txBody>
+      </p:sp>
+      <p:sp>
+        <p:nvSpPr>
+          <p:cNvPr id="4" name="Espace réservé du pied de page 3"/>
+          <p:cNvSpPr>
+            <a:spLocks noGrp="1"/>
+          </p:cNvSpPr>
+          <p:nvPr>
+            <p:ph type="ftr" sz="quarter" idx="11"/>
+          </p:nvPr>
+        </p:nvSpPr>
+        <p:spPr/>
+        <p:txBody>
+          <a:bodyPr/>
+          <a:lstStyle/>
+          <a:p>
+            <a:r>
+              <a:rPr lang="fr-FR"/>
+              <a:t>Sasyan Valentin</a:t>
+            </a:r>
+          </a:p>
+        </p:txBody>
+      </p:sp>
+      <p:sp>
+        <p:nvSpPr>
+          <p:cNvPr id="6" name="Espace réservé du numéro de diapositive 5"/>
+          <p:cNvSpPr>
+            <a:spLocks noGrp="1"/>
+          </p:cNvSpPr>
+          <p:nvPr>
+            <p:ph type="sldNum" sz="quarter" idx="12"/>
+          </p:nvPr>
+        </p:nvSpPr>
+        <p:spPr/>
+        <p:txBody>
+          <a:bodyPr/>
+          <a:lstStyle/>
+          <a:p>
+            <a:fld id="{3A78B538-00F0-400D-A284-C229639D6691}" type="slidenum">
+              <a:rPr lang="fr-FR" smtClean="0"/>
+              <a:t>6</a:t>
+            </a:fld>
+            <a:endParaRPr lang="fr-FR"/>
+          </a:p>
+        </p:txBody>
+      </p:sp>
+      <p:pic>
+        <p:nvPicPr>
+          <p:cNvPr id="9" name="Espace réservé du contenu 8">
+            <a:extLst>
+              <a:ext uri="{FF2B5EF4-FFF2-40B4-BE49-F238E27FC236}">
+                <a16:creationId xmlns:a16="http://schemas.microsoft.com/office/drawing/2014/main" id="{934EC805-A419-4450-9342-24D42EB4DE5B}"/>
+              </a:ext>
+            </a:extLst>
+          </p:cNvPr>
+          <p:cNvPicPr>
+            <a:picLocks noGrp="1" noChangeAspect="1"/>
+          </p:cNvPicPr>
+          <p:nvPr>
+            <p:ph sz="half" idx="2"/>
+          </p:nvPr>
+        </p:nvPicPr>
+        <p:blipFill>
+          <a:blip r:embed="rId3" cstate="print">
+            <a:extLst>
+              <a:ext uri="{28A0092B-C50C-407E-A947-70E740481C1C}">
+                <a14:useLocalDpi xmlns:a14="http://schemas.microsoft.com/office/drawing/2010/main" val="0"/>
+              </a:ext>
+            </a:extLst>
+          </a:blip>
+          <a:stretch>
+            <a:fillRect/>
+          </a:stretch>
+        </p:blipFill>
+        <p:spPr>
+          <a:xfrm>
+            <a:off x="6172200" y="2929998"/>
+            <a:ext cx="5181600" cy="2142591"/>
+          </a:xfrm>
+        </p:spPr>
+      </p:pic>
+    </p:spTree>
+    <p:extLst>
+      <p:ext uri="{BB962C8B-B14F-4D97-AF65-F5344CB8AC3E}">
+        <p14:creationId xmlns:p14="http://schemas.microsoft.com/office/powerpoint/2010/main" val="935420595"/>
       </p:ext>
     </p:extLst>
   </p:cSld>

</xml_diff>

<commit_message>
Mise à jour 2022
</commit_message>
<xml_diff>
--- a/0_ressources/design_patterns.pptx
+++ b/0_ressources/design_patterns.pptx
@@ -201,7 +201,7 @@
           <a:p>
             <a:fld id="{2A11EF29-F031-4460-BDC1-2F4C0816FF62}" type="datetimeFigureOut">
               <a:rPr lang="fr-FR" smtClean="0"/>
-              <a:t>18/01/2022</a:t>
+              <a:t>28/01/2023</a:t>
             </a:fld>
             <a:endParaRPr lang="fr-FR"/>
           </a:p>
@@ -933,7 +933,7 @@
           <a:p>
             <a:fld id="{61E68B4C-A18C-4580-9DBF-10C1B552DA0A}" type="datetime1">
               <a:rPr lang="fr-FR" smtClean="0"/>
-              <a:t>18/01/2022</a:t>
+              <a:t>28/01/2023</a:t>
             </a:fld>
             <a:endParaRPr lang="fr-FR"/>
           </a:p>
@@ -1104,7 +1104,7 @@
           <a:p>
             <a:fld id="{33BBDF30-760E-44D6-9977-54B88BDB306F}" type="datetime1">
               <a:rPr lang="fr-FR" smtClean="0"/>
-              <a:t>18/01/2022</a:t>
+              <a:t>28/01/2023</a:t>
             </a:fld>
             <a:endParaRPr lang="fr-FR"/>
           </a:p>
@@ -1285,7 +1285,7 @@
           <a:p>
             <a:fld id="{936C1701-50D5-46A3-8884-D7962FCBEB35}" type="datetime1">
               <a:rPr lang="fr-FR" smtClean="0"/>
-              <a:t>18/01/2022</a:t>
+              <a:t>28/01/2023</a:t>
             </a:fld>
             <a:endParaRPr lang="fr-FR"/>
           </a:p>
@@ -1456,7 +1456,7 @@
           <a:p>
             <a:fld id="{FB1C5CD7-A317-4B47-8334-BE6C77F3043D}" type="datetime1">
               <a:rPr lang="fr-FR" smtClean="0"/>
-              <a:t>18/01/2022</a:t>
+              <a:t>28/01/2023</a:t>
             </a:fld>
             <a:endParaRPr lang="fr-FR"/>
           </a:p>
@@ -1704,7 +1704,7 @@
           <a:p>
             <a:fld id="{27BB4E62-2182-4E64-A865-E0316FE55639}" type="datetime1">
               <a:rPr lang="fr-FR" smtClean="0"/>
-              <a:t>18/01/2022</a:t>
+              <a:t>28/01/2023</a:t>
             </a:fld>
             <a:endParaRPr lang="fr-FR"/>
           </a:p>
@@ -1936,7 +1936,7 @@
           <a:p>
             <a:fld id="{5C848654-37BD-4CD6-BC6D-5ABAE3294E16}" type="datetime1">
               <a:rPr lang="fr-FR" smtClean="0"/>
-              <a:t>18/01/2022</a:t>
+              <a:t>28/01/2023</a:t>
             </a:fld>
             <a:endParaRPr lang="fr-FR"/>
           </a:p>
@@ -2303,7 +2303,7 @@
           <a:p>
             <a:fld id="{868D0E6B-48A9-4A38-BF7D-049DC383303E}" type="datetime1">
               <a:rPr lang="fr-FR" smtClean="0"/>
-              <a:t>18/01/2022</a:t>
+              <a:t>28/01/2023</a:t>
             </a:fld>
             <a:endParaRPr lang="fr-FR"/>
           </a:p>
@@ -2423,7 +2423,7 @@
           <a:p>
             <a:fld id="{48C90E04-18E3-4E93-8B1D-B61C20F8CDF0}" type="datetime1">
               <a:rPr lang="fr-FR" smtClean="0"/>
-              <a:t>18/01/2022</a:t>
+              <a:t>28/01/2023</a:t>
             </a:fld>
             <a:endParaRPr lang="fr-FR"/>
           </a:p>
@@ -2521,7 +2521,7 @@
           <a:p>
             <a:fld id="{35B94D30-C13E-4A60-87D1-612090FE3305}" type="datetime1">
               <a:rPr lang="fr-FR" smtClean="0"/>
-              <a:t>18/01/2022</a:t>
+              <a:t>28/01/2023</a:t>
             </a:fld>
             <a:endParaRPr lang="fr-FR"/>
           </a:p>
@@ -2799,7 +2799,7 @@
           <a:p>
             <a:fld id="{566614E8-8C48-447B-8312-B5AD964AE5CA}" type="datetime1">
               <a:rPr lang="fr-FR" smtClean="0"/>
-              <a:t>18/01/2022</a:t>
+              <a:t>28/01/2023</a:t>
             </a:fld>
             <a:endParaRPr lang="fr-FR"/>
           </a:p>
@@ -3054,7 +3054,7 @@
           <a:p>
             <a:fld id="{269CDBDD-4A65-4264-B0FD-6A38E12ADD25}" type="datetime1">
               <a:rPr lang="fr-FR" smtClean="0"/>
-              <a:t>18/01/2022</a:t>
+              <a:t>28/01/2023</a:t>
             </a:fld>
             <a:endParaRPr lang="fr-FR"/>
           </a:p>
@@ -3268,7 +3268,7 @@
           <a:p>
             <a:fld id="{A2F7CCBE-29F8-4CD9-B9A9-0931E30CBD53}" type="datetime1">
               <a:rPr lang="fr-FR" smtClean="0"/>
-              <a:t>18/01/2022</a:t>
+              <a:t>28/01/2023</a:t>
             </a:fld>
             <a:endParaRPr lang="fr-FR"/>
           </a:p>
@@ -3718,12 +3718,8 @@
           <a:lstStyle/>
           <a:p>
             <a:r>
-              <a:rPr lang="fr-FR"/>
-              <a:t>ENSG, </a:t>
-            </a:r>
-            <a:r>
               <a:rPr lang="fr-FR" dirty="0"/>
-              <a:t>Cours d’introduction à Android</a:t>
+              <a:t>ENSG, Cours d’applications mobiles</a:t>
             </a:r>
           </a:p>
         </p:txBody>

</xml_diff>